<commit_message>
ENH:Stats For Decision Making Day 3 Live Session Content
</commit_message>
<xml_diff>
--- a/python/live_sessions/stats_decision_making/decks/Hypothesis Testing/Problems.pptx
+++ b/python/live_sessions/stats_decision_making/decks/Hypothesis Testing/Problems.pptx
@@ -271,7 +271,7 @@
           <a:p>
             <a:fld id="{942758FF-D1BD-4BAF-AD97-971C9CA8069E}" type="datetimeFigureOut">
               <a:rPr lang="en-IN" smtClean="0"/>
-              <a:t>04-07-2023</a:t>
+              <a:t>11-07-2023</a:t>
             </a:fld>
             <a:endParaRPr lang="en-IN"/>
           </a:p>
@@ -471,7 +471,7 @@
           <a:p>
             <a:fld id="{942758FF-D1BD-4BAF-AD97-971C9CA8069E}" type="datetimeFigureOut">
               <a:rPr lang="en-IN" smtClean="0"/>
-              <a:t>04-07-2023</a:t>
+              <a:t>11-07-2023</a:t>
             </a:fld>
             <a:endParaRPr lang="en-IN"/>
           </a:p>
@@ -681,7 +681,7 @@
           <a:p>
             <a:fld id="{942758FF-D1BD-4BAF-AD97-971C9CA8069E}" type="datetimeFigureOut">
               <a:rPr lang="en-IN" smtClean="0"/>
-              <a:t>04-07-2023</a:t>
+              <a:t>11-07-2023</a:t>
             </a:fld>
             <a:endParaRPr lang="en-IN"/>
           </a:p>
@@ -881,7 +881,7 @@
           <a:p>
             <a:fld id="{942758FF-D1BD-4BAF-AD97-971C9CA8069E}" type="datetimeFigureOut">
               <a:rPr lang="en-IN" smtClean="0"/>
-              <a:t>04-07-2023</a:t>
+              <a:t>11-07-2023</a:t>
             </a:fld>
             <a:endParaRPr lang="en-IN"/>
           </a:p>
@@ -1157,7 +1157,7 @@
           <a:p>
             <a:fld id="{942758FF-D1BD-4BAF-AD97-971C9CA8069E}" type="datetimeFigureOut">
               <a:rPr lang="en-IN" smtClean="0"/>
-              <a:t>04-07-2023</a:t>
+              <a:t>11-07-2023</a:t>
             </a:fld>
             <a:endParaRPr lang="en-IN"/>
           </a:p>
@@ -1425,7 +1425,7 @@
           <a:p>
             <a:fld id="{942758FF-D1BD-4BAF-AD97-971C9CA8069E}" type="datetimeFigureOut">
               <a:rPr lang="en-IN" smtClean="0"/>
-              <a:t>04-07-2023</a:t>
+              <a:t>11-07-2023</a:t>
             </a:fld>
             <a:endParaRPr lang="en-IN"/>
           </a:p>
@@ -1840,7 +1840,7 @@
           <a:p>
             <a:fld id="{942758FF-D1BD-4BAF-AD97-971C9CA8069E}" type="datetimeFigureOut">
               <a:rPr lang="en-IN" smtClean="0"/>
-              <a:t>04-07-2023</a:t>
+              <a:t>11-07-2023</a:t>
             </a:fld>
             <a:endParaRPr lang="en-IN"/>
           </a:p>
@@ -1982,7 +1982,7 @@
           <a:p>
             <a:fld id="{942758FF-D1BD-4BAF-AD97-971C9CA8069E}" type="datetimeFigureOut">
               <a:rPr lang="en-IN" smtClean="0"/>
-              <a:t>04-07-2023</a:t>
+              <a:t>11-07-2023</a:t>
             </a:fld>
             <a:endParaRPr lang="en-IN"/>
           </a:p>
@@ -2095,7 +2095,7 @@
           <a:p>
             <a:fld id="{942758FF-D1BD-4BAF-AD97-971C9CA8069E}" type="datetimeFigureOut">
               <a:rPr lang="en-IN" smtClean="0"/>
-              <a:t>04-07-2023</a:t>
+              <a:t>11-07-2023</a:t>
             </a:fld>
             <a:endParaRPr lang="en-IN"/>
           </a:p>
@@ -2408,7 +2408,7 @@
           <a:p>
             <a:fld id="{942758FF-D1BD-4BAF-AD97-971C9CA8069E}" type="datetimeFigureOut">
               <a:rPr lang="en-IN" smtClean="0"/>
-              <a:t>04-07-2023</a:t>
+              <a:t>11-07-2023</a:t>
             </a:fld>
             <a:endParaRPr lang="en-IN"/>
           </a:p>
@@ -2697,7 +2697,7 @@
           <a:p>
             <a:fld id="{942758FF-D1BD-4BAF-AD97-971C9CA8069E}" type="datetimeFigureOut">
               <a:rPr lang="en-IN" smtClean="0"/>
-              <a:t>04-07-2023</a:t>
+              <a:t>11-07-2023</a:t>
             </a:fld>
             <a:endParaRPr lang="en-IN"/>
           </a:p>
@@ -2940,7 +2940,7 @@
           <a:p>
             <a:fld id="{942758FF-D1BD-4BAF-AD97-971C9CA8069E}" type="datetimeFigureOut">
               <a:rPr lang="en-IN" smtClean="0"/>
-              <a:t>04-07-2023</a:t>
+              <a:t>11-07-2023</a:t>
             </a:fld>
             <a:endParaRPr lang="en-IN"/>
           </a:p>

</xml_diff>